<commit_message>
Newer version used in speech
</commit_message>
<xml_diff>
--- a/plugtalk16oct.pptx
+++ b/plugtalk16oct.pptx
@@ -74,13 +74,13 @@
         </a:solidFill>
         <a:effectLst/>
         <a:uFillTx/>
-        <a:latin typeface="+mn-lt"/>
-        <a:ea typeface="+mn-ea"/>
-        <a:cs typeface="+mn-cs"/>
+        <a:latin typeface="Helvetica Light"/>
+        <a:ea typeface="Helvetica Light"/>
+        <a:cs typeface="Helvetica Light"/>
         <a:sym typeface="Helvetica Light"/>
       </a:defRPr>
     </a:lvl1pPr>
-    <a:lvl2pPr marL="0" marR="0" indent="228600" algn="ctr" defTabSz="584200" rtl="0" fontAlgn="auto" latinLnBrk="0" hangingPunct="0">
+    <a:lvl2pPr marL="0" marR="0" indent="0" algn="ctr" defTabSz="584200" rtl="0" fontAlgn="auto" latinLnBrk="0" hangingPunct="0">
       <a:lnSpc>
         <a:spcPct val="100000"/>
       </a:lnSpc>
@@ -104,13 +104,13 @@
         </a:solidFill>
         <a:effectLst/>
         <a:uFillTx/>
-        <a:latin typeface="+mn-lt"/>
-        <a:ea typeface="+mn-ea"/>
-        <a:cs typeface="+mn-cs"/>
+        <a:latin typeface="Helvetica Light"/>
+        <a:ea typeface="Helvetica Light"/>
+        <a:cs typeface="Helvetica Light"/>
         <a:sym typeface="Helvetica Light"/>
       </a:defRPr>
     </a:lvl2pPr>
-    <a:lvl3pPr marL="0" marR="0" indent="457200" algn="ctr" defTabSz="584200" rtl="0" fontAlgn="auto" latinLnBrk="0" hangingPunct="0">
+    <a:lvl3pPr marL="0" marR="0" indent="0" algn="ctr" defTabSz="584200" rtl="0" fontAlgn="auto" latinLnBrk="0" hangingPunct="0">
       <a:lnSpc>
         <a:spcPct val="100000"/>
       </a:lnSpc>
@@ -134,13 +134,13 @@
         </a:solidFill>
         <a:effectLst/>
         <a:uFillTx/>
-        <a:latin typeface="+mn-lt"/>
-        <a:ea typeface="+mn-ea"/>
-        <a:cs typeface="+mn-cs"/>
+        <a:latin typeface="Helvetica Light"/>
+        <a:ea typeface="Helvetica Light"/>
+        <a:cs typeface="Helvetica Light"/>
         <a:sym typeface="Helvetica Light"/>
       </a:defRPr>
     </a:lvl3pPr>
-    <a:lvl4pPr marL="0" marR="0" indent="685800" algn="ctr" defTabSz="584200" rtl="0" fontAlgn="auto" latinLnBrk="0" hangingPunct="0">
+    <a:lvl4pPr marL="0" marR="0" indent="0" algn="ctr" defTabSz="584200" rtl="0" fontAlgn="auto" latinLnBrk="0" hangingPunct="0">
       <a:lnSpc>
         <a:spcPct val="100000"/>
       </a:lnSpc>
@@ -164,13 +164,13 @@
         </a:solidFill>
         <a:effectLst/>
         <a:uFillTx/>
-        <a:latin typeface="+mn-lt"/>
-        <a:ea typeface="+mn-ea"/>
-        <a:cs typeface="+mn-cs"/>
+        <a:latin typeface="Helvetica Light"/>
+        <a:ea typeface="Helvetica Light"/>
+        <a:cs typeface="Helvetica Light"/>
         <a:sym typeface="Helvetica Light"/>
       </a:defRPr>
     </a:lvl4pPr>
-    <a:lvl5pPr marL="0" marR="0" indent="914400" algn="ctr" defTabSz="584200" rtl="0" fontAlgn="auto" latinLnBrk="0" hangingPunct="0">
+    <a:lvl5pPr marL="0" marR="0" indent="0" algn="ctr" defTabSz="584200" rtl="0" fontAlgn="auto" latinLnBrk="0" hangingPunct="0">
       <a:lnSpc>
         <a:spcPct val="100000"/>
       </a:lnSpc>
@@ -194,13 +194,13 @@
         </a:solidFill>
         <a:effectLst/>
         <a:uFillTx/>
-        <a:latin typeface="+mn-lt"/>
-        <a:ea typeface="+mn-ea"/>
-        <a:cs typeface="+mn-cs"/>
+        <a:latin typeface="Helvetica Light"/>
+        <a:ea typeface="Helvetica Light"/>
+        <a:cs typeface="Helvetica Light"/>
         <a:sym typeface="Helvetica Light"/>
       </a:defRPr>
     </a:lvl5pPr>
-    <a:lvl6pPr marL="0" marR="0" indent="1143000" algn="ctr" defTabSz="584200" rtl="0" fontAlgn="auto" latinLnBrk="0" hangingPunct="0">
+    <a:lvl6pPr marL="0" marR="0" indent="0" algn="ctr" defTabSz="584200" rtl="0" fontAlgn="auto" latinLnBrk="0" hangingPunct="0">
       <a:lnSpc>
         <a:spcPct val="100000"/>
       </a:lnSpc>
@@ -224,13 +224,13 @@
         </a:solidFill>
         <a:effectLst/>
         <a:uFillTx/>
-        <a:latin typeface="+mn-lt"/>
-        <a:ea typeface="+mn-ea"/>
-        <a:cs typeface="+mn-cs"/>
+        <a:latin typeface="Helvetica Light"/>
+        <a:ea typeface="Helvetica Light"/>
+        <a:cs typeface="Helvetica Light"/>
         <a:sym typeface="Helvetica Light"/>
       </a:defRPr>
     </a:lvl6pPr>
-    <a:lvl7pPr marL="0" marR="0" indent="1371600" algn="ctr" defTabSz="584200" rtl="0" fontAlgn="auto" latinLnBrk="0" hangingPunct="0">
+    <a:lvl7pPr marL="0" marR="0" indent="0" algn="ctr" defTabSz="584200" rtl="0" fontAlgn="auto" latinLnBrk="0" hangingPunct="0">
       <a:lnSpc>
         <a:spcPct val="100000"/>
       </a:lnSpc>
@@ -254,13 +254,13 @@
         </a:solidFill>
         <a:effectLst/>
         <a:uFillTx/>
-        <a:latin typeface="+mn-lt"/>
-        <a:ea typeface="+mn-ea"/>
-        <a:cs typeface="+mn-cs"/>
+        <a:latin typeface="Helvetica Light"/>
+        <a:ea typeface="Helvetica Light"/>
+        <a:cs typeface="Helvetica Light"/>
         <a:sym typeface="Helvetica Light"/>
       </a:defRPr>
     </a:lvl7pPr>
-    <a:lvl8pPr marL="0" marR="0" indent="1600200" algn="ctr" defTabSz="584200" rtl="0" fontAlgn="auto" latinLnBrk="0" hangingPunct="0">
+    <a:lvl8pPr marL="0" marR="0" indent="0" algn="ctr" defTabSz="584200" rtl="0" fontAlgn="auto" latinLnBrk="0" hangingPunct="0">
       <a:lnSpc>
         <a:spcPct val="100000"/>
       </a:lnSpc>
@@ -284,13 +284,13 @@
         </a:solidFill>
         <a:effectLst/>
         <a:uFillTx/>
-        <a:latin typeface="+mn-lt"/>
-        <a:ea typeface="+mn-ea"/>
-        <a:cs typeface="+mn-cs"/>
+        <a:latin typeface="Helvetica Light"/>
+        <a:ea typeface="Helvetica Light"/>
+        <a:cs typeface="Helvetica Light"/>
         <a:sym typeface="Helvetica Light"/>
       </a:defRPr>
     </a:lvl8pPr>
-    <a:lvl9pPr marL="0" marR="0" indent="1828800" algn="ctr" defTabSz="584200" rtl="0" fontAlgn="auto" latinLnBrk="0" hangingPunct="0">
+    <a:lvl9pPr marL="0" marR="0" indent="0" algn="ctr" defTabSz="584200" rtl="0" fontAlgn="auto" latinLnBrk="0" hangingPunct="0">
       <a:lnSpc>
         <a:spcPct val="100000"/>
       </a:lnSpc>
@@ -314,9 +314,9 @@
         </a:solidFill>
         <a:effectLst/>
         <a:uFillTx/>
-        <a:latin typeface="+mn-lt"/>
-        <a:ea typeface="+mn-ea"/>
-        <a:cs typeface="+mn-cs"/>
+        <a:latin typeface="Helvetica Light"/>
+        <a:ea typeface="Helvetica Light"/>
+        <a:cs typeface="Helvetica Light"/>
         <a:sym typeface="Helvetica Light"/>
       </a:defRPr>
     </a:lvl9pPr>
@@ -404,9 +404,9 @@
         <a:spcPct val="117999"/>
       </a:lnSpc>
       <a:defRPr sz="2200">
-        <a:latin typeface="Helvetica Neue"/>
-        <a:ea typeface="Helvetica Neue"/>
-        <a:cs typeface="Helvetica Neue"/>
+        <a:latin typeface="+mn-lt"/>
+        <a:ea typeface="+mn-ea"/>
+        <a:cs typeface="+mn-cs"/>
         <a:sym typeface="Helvetica Neue"/>
       </a:defRPr>
     </a:lvl1pPr>
@@ -415,9 +415,9 @@
         <a:spcPct val="117999"/>
       </a:lnSpc>
       <a:defRPr sz="2200">
-        <a:latin typeface="Helvetica Neue"/>
-        <a:ea typeface="Helvetica Neue"/>
-        <a:cs typeface="Helvetica Neue"/>
+        <a:latin typeface="+mn-lt"/>
+        <a:ea typeface="+mn-ea"/>
+        <a:cs typeface="+mn-cs"/>
         <a:sym typeface="Helvetica Neue"/>
       </a:defRPr>
     </a:lvl2pPr>
@@ -426,9 +426,9 @@
         <a:spcPct val="117999"/>
       </a:lnSpc>
       <a:defRPr sz="2200">
-        <a:latin typeface="Helvetica Neue"/>
-        <a:ea typeface="Helvetica Neue"/>
-        <a:cs typeface="Helvetica Neue"/>
+        <a:latin typeface="+mn-lt"/>
+        <a:ea typeface="+mn-ea"/>
+        <a:cs typeface="+mn-cs"/>
         <a:sym typeface="Helvetica Neue"/>
       </a:defRPr>
     </a:lvl3pPr>
@@ -437,9 +437,9 @@
         <a:spcPct val="117999"/>
       </a:lnSpc>
       <a:defRPr sz="2200">
-        <a:latin typeface="Helvetica Neue"/>
-        <a:ea typeface="Helvetica Neue"/>
-        <a:cs typeface="Helvetica Neue"/>
+        <a:latin typeface="+mn-lt"/>
+        <a:ea typeface="+mn-ea"/>
+        <a:cs typeface="+mn-cs"/>
         <a:sym typeface="Helvetica Neue"/>
       </a:defRPr>
     </a:lvl4pPr>
@@ -448,9 +448,9 @@
         <a:spcPct val="117999"/>
       </a:lnSpc>
       <a:defRPr sz="2200">
-        <a:latin typeface="Helvetica Neue"/>
-        <a:ea typeface="Helvetica Neue"/>
-        <a:cs typeface="Helvetica Neue"/>
+        <a:latin typeface="+mn-lt"/>
+        <a:ea typeface="+mn-ea"/>
+        <a:cs typeface="+mn-cs"/>
         <a:sym typeface="Helvetica Neue"/>
       </a:defRPr>
     </a:lvl5pPr>
@@ -459,9 +459,9 @@
         <a:spcPct val="117999"/>
       </a:lnSpc>
       <a:defRPr sz="2200">
-        <a:latin typeface="Helvetica Neue"/>
-        <a:ea typeface="Helvetica Neue"/>
-        <a:cs typeface="Helvetica Neue"/>
+        <a:latin typeface="+mn-lt"/>
+        <a:ea typeface="+mn-ea"/>
+        <a:cs typeface="+mn-cs"/>
         <a:sym typeface="Helvetica Neue"/>
       </a:defRPr>
     </a:lvl6pPr>
@@ -470,9 +470,9 @@
         <a:spcPct val="117999"/>
       </a:lnSpc>
       <a:defRPr sz="2200">
-        <a:latin typeface="Helvetica Neue"/>
-        <a:ea typeface="Helvetica Neue"/>
-        <a:cs typeface="Helvetica Neue"/>
+        <a:latin typeface="+mn-lt"/>
+        <a:ea typeface="+mn-ea"/>
+        <a:cs typeface="+mn-cs"/>
         <a:sym typeface="Helvetica Neue"/>
       </a:defRPr>
     </a:lvl7pPr>
@@ -481,9 +481,9 @@
         <a:spcPct val="117999"/>
       </a:lnSpc>
       <a:defRPr sz="2200">
-        <a:latin typeface="Helvetica Neue"/>
-        <a:ea typeface="Helvetica Neue"/>
-        <a:cs typeface="Helvetica Neue"/>
+        <a:latin typeface="+mn-lt"/>
+        <a:ea typeface="+mn-ea"/>
+        <a:cs typeface="+mn-cs"/>
         <a:sym typeface="Helvetica Neue"/>
       </a:defRPr>
     </a:lvl8pPr>
@@ -492,9 +492,9 @@
         <a:spcPct val="117999"/>
       </a:lnSpc>
       <a:defRPr sz="2200">
-        <a:latin typeface="Helvetica Neue"/>
-        <a:ea typeface="Helvetica Neue"/>
-        <a:cs typeface="Helvetica Neue"/>
+        <a:latin typeface="+mn-lt"/>
+        <a:ea typeface="+mn-ea"/>
+        <a:cs typeface="+mn-cs"/>
         <a:sym typeface="Helvetica Neue"/>
       </a:defRPr>
     </a:lvl9pPr>
@@ -575,7 +575,7 @@
               <a:buNone/>
               <a:defRPr sz="3200"/>
             </a:lvl1pPr>
-            <a:lvl2pPr marL="0" indent="228600" algn="ctr">
+            <a:lvl2pPr marL="0" indent="0" algn="ctr">
               <a:spcBef>
                 <a:spcPts val="0"/>
               </a:spcBef>
@@ -583,7 +583,7 @@
               <a:buNone/>
               <a:defRPr sz="3200"/>
             </a:lvl2pPr>
-            <a:lvl3pPr marL="0" indent="457200" algn="ctr">
+            <a:lvl3pPr marL="0" indent="0" algn="ctr">
               <a:spcBef>
                 <a:spcPts val="0"/>
               </a:spcBef>
@@ -591,7 +591,7 @@
               <a:buNone/>
               <a:defRPr sz="3200"/>
             </a:lvl3pPr>
-            <a:lvl4pPr marL="0" indent="685800" algn="ctr">
+            <a:lvl4pPr marL="0" indent="0" algn="ctr">
               <a:spcBef>
                 <a:spcPts val="0"/>
               </a:spcBef>
@@ -599,7 +599,7 @@
               <a:buNone/>
               <a:defRPr sz="3200"/>
             </a:lvl4pPr>
-            <a:lvl5pPr marL="0" indent="914400" algn="ctr">
+            <a:lvl5pPr marL="0" indent="0" algn="ctr">
               <a:spcBef>
                 <a:spcPts val="0"/>
               </a:spcBef>
@@ -693,7 +693,7 @@
           <p:cNvPr id="93" name="Shape 93"/>
           <p:cNvSpPr/>
           <p:nvPr>
-            <p:ph type="body" sz="quarter" idx="13"/>
+            <p:ph type="body" sz="quarter" idx="1"/>
           </p:nvPr>
         </p:nvSpPr>
         <p:spPr>
@@ -706,9 +706,7 @@
           </a:prstGeom>
         </p:spPr>
         <p:txBody>
-          <a:bodyPr anchor="t">
-            <a:spAutoFit/>
-          </a:bodyPr>
+          <a:bodyPr anchor="t"/>
           <a:lstStyle>
             <a:lvl1pPr marL="0" indent="0" algn="ctr">
               <a:spcBef>
@@ -732,7 +730,7 @@
           <p:cNvPr id="94" name="Shape 94"/>
           <p:cNvSpPr/>
           <p:nvPr>
-            <p:ph type="body" sz="quarter" idx="14"/>
+            <p:ph type="body" sz="quarter" idx="13"/>
           </p:nvPr>
         </p:nvSpPr>
         <p:spPr>
@@ -745,24 +743,17 @@
           </a:prstGeom>
         </p:spPr>
         <p:txBody>
-          <a:bodyPr>
-            <a:spAutoFit/>
-          </a:bodyPr>
-          <a:lstStyle>
-            <a:lvl1pPr marL="0" indent="0" algn="ctr">
+          <a:bodyPr/>
+          <a:lstStyle/>
+          <a:p>
+            <a:pPr marL="0" indent="0" algn="ctr">
               <a:spcBef>
                 <a:spcPts val="0"/>
               </a:spcBef>
               <a:buSzTx/>
               <a:buNone/>
               <a:defRPr sz="3800"/>
-            </a:lvl1pPr>
-          </a:lstStyle>
-          <a:p>
-            <a:pPr/>
-            <a:r>
-              <a:t>“Type a quote here.” </a:t>
-            </a:r>
+            </a:pPr>
           </a:p>
         </p:txBody>
       </p:sp>
@@ -1020,7 +1011,7 @@
               <a:buNone/>
               <a:defRPr sz="3200"/>
             </a:lvl1pPr>
-            <a:lvl2pPr marL="0" indent="228600" algn="ctr">
+            <a:lvl2pPr marL="0" indent="0" algn="ctr">
               <a:spcBef>
                 <a:spcPts val="0"/>
               </a:spcBef>
@@ -1028,7 +1019,7 @@
               <a:buNone/>
               <a:defRPr sz="3200"/>
             </a:lvl2pPr>
-            <a:lvl3pPr marL="0" indent="457200" algn="ctr">
+            <a:lvl3pPr marL="0" indent="0" algn="ctr">
               <a:spcBef>
                 <a:spcPts val="0"/>
               </a:spcBef>
@@ -1036,7 +1027,7 @@
               <a:buNone/>
               <a:defRPr sz="3200"/>
             </a:lvl3pPr>
-            <a:lvl4pPr marL="0" indent="685800" algn="ctr">
+            <a:lvl4pPr marL="0" indent="0" algn="ctr">
               <a:spcBef>
                 <a:spcPts val="0"/>
               </a:spcBef>
@@ -1044,7 +1035,7 @@
               <a:buNone/>
               <a:defRPr sz="3200"/>
             </a:lvl4pPr>
-            <a:lvl5pPr marL="0" indent="914400" algn="ctr">
+            <a:lvl5pPr marL="0" indent="0" algn="ctr">
               <a:spcBef>
                 <a:spcPts val="0"/>
               </a:spcBef>
@@ -1300,7 +1291,7 @@
               <a:buNone/>
               <a:defRPr sz="3200"/>
             </a:lvl1pPr>
-            <a:lvl2pPr marL="0" indent="228600" algn="ctr">
+            <a:lvl2pPr marL="0" indent="0" algn="ctr">
               <a:spcBef>
                 <a:spcPts val="0"/>
               </a:spcBef>
@@ -1308,7 +1299,7 @@
               <a:buNone/>
               <a:defRPr sz="3200"/>
             </a:lvl2pPr>
-            <a:lvl3pPr marL="0" indent="457200" algn="ctr">
+            <a:lvl3pPr marL="0" indent="0" algn="ctr">
               <a:spcBef>
                 <a:spcPts val="0"/>
               </a:spcBef>
@@ -1316,7 +1307,7 @@
               <a:buNone/>
               <a:defRPr sz="3200"/>
             </a:lvl3pPr>
-            <a:lvl4pPr marL="0" indent="685800" algn="ctr">
+            <a:lvl4pPr marL="0" indent="0" algn="ctr">
               <a:spcBef>
                 <a:spcPts val="0"/>
               </a:spcBef>
@@ -1324,7 +1315,7 @@
               <a:buNone/>
               <a:defRPr sz="3200"/>
             </a:lvl4pPr>
-            <a:lvl5pPr marL="0" indent="914400" algn="ctr">
+            <a:lvl5pPr marL="0" indent="0" algn="ctr">
               <a:spcBef>
                 <a:spcPts val="0"/>
               </a:spcBef>
@@ -1925,7 +1916,7 @@
         <p:spPr>
           <a:xfrm>
             <a:off x="6724518" y="889000"/>
-            <a:ext cx="5334001" cy="3771900"/>
+            <a:ext cx="5334002" cy="3771900"/>
           </a:xfrm>
           <a:prstGeom prst="rect">
             <a:avLst/>
@@ -2201,13 +2192,13 @@
             <a:srgbClr val="000000"/>
           </a:solidFill>
           <a:uFillTx/>
-          <a:latin typeface="+mn-lt"/>
-          <a:ea typeface="+mn-ea"/>
-          <a:cs typeface="+mn-cs"/>
+          <a:latin typeface="Helvetica Light"/>
+          <a:ea typeface="Helvetica Light"/>
+          <a:cs typeface="Helvetica Light"/>
           <a:sym typeface="Helvetica Light"/>
         </a:defRPr>
       </a:lvl1pPr>
-      <a:lvl2pPr marL="0" marR="0" indent="228600" algn="ctr" defTabSz="584200" rtl="0" latinLnBrk="0">
+      <a:lvl2pPr marL="0" marR="0" indent="0" algn="ctr" defTabSz="584200" rtl="0" latinLnBrk="0">
         <a:lnSpc>
           <a:spcPct val="100000"/>
         </a:lnSpc>
@@ -2230,13 +2221,13 @@
             <a:srgbClr val="000000"/>
           </a:solidFill>
           <a:uFillTx/>
-          <a:latin typeface="+mn-lt"/>
-          <a:ea typeface="+mn-ea"/>
-          <a:cs typeface="+mn-cs"/>
+          <a:latin typeface="Helvetica Light"/>
+          <a:ea typeface="Helvetica Light"/>
+          <a:cs typeface="Helvetica Light"/>
           <a:sym typeface="Helvetica Light"/>
         </a:defRPr>
       </a:lvl2pPr>
-      <a:lvl3pPr marL="0" marR="0" indent="457200" algn="ctr" defTabSz="584200" rtl="0" latinLnBrk="0">
+      <a:lvl3pPr marL="0" marR="0" indent="0" algn="ctr" defTabSz="584200" rtl="0" latinLnBrk="0">
         <a:lnSpc>
           <a:spcPct val="100000"/>
         </a:lnSpc>
@@ -2259,13 +2250,13 @@
             <a:srgbClr val="000000"/>
           </a:solidFill>
           <a:uFillTx/>
-          <a:latin typeface="+mn-lt"/>
-          <a:ea typeface="+mn-ea"/>
-          <a:cs typeface="+mn-cs"/>
+          <a:latin typeface="Helvetica Light"/>
+          <a:ea typeface="Helvetica Light"/>
+          <a:cs typeface="Helvetica Light"/>
           <a:sym typeface="Helvetica Light"/>
         </a:defRPr>
       </a:lvl3pPr>
-      <a:lvl4pPr marL="0" marR="0" indent="685800" algn="ctr" defTabSz="584200" rtl="0" latinLnBrk="0">
+      <a:lvl4pPr marL="0" marR="0" indent="0" algn="ctr" defTabSz="584200" rtl="0" latinLnBrk="0">
         <a:lnSpc>
           <a:spcPct val="100000"/>
         </a:lnSpc>
@@ -2288,13 +2279,13 @@
             <a:srgbClr val="000000"/>
           </a:solidFill>
           <a:uFillTx/>
-          <a:latin typeface="+mn-lt"/>
-          <a:ea typeface="+mn-ea"/>
-          <a:cs typeface="+mn-cs"/>
+          <a:latin typeface="Helvetica Light"/>
+          <a:ea typeface="Helvetica Light"/>
+          <a:cs typeface="Helvetica Light"/>
           <a:sym typeface="Helvetica Light"/>
         </a:defRPr>
       </a:lvl4pPr>
-      <a:lvl5pPr marL="0" marR="0" indent="914400" algn="ctr" defTabSz="584200" rtl="0" latinLnBrk="0">
+      <a:lvl5pPr marL="0" marR="0" indent="0" algn="ctr" defTabSz="584200" rtl="0" latinLnBrk="0">
         <a:lnSpc>
           <a:spcPct val="100000"/>
         </a:lnSpc>
@@ -2317,13 +2308,13 @@
             <a:srgbClr val="000000"/>
           </a:solidFill>
           <a:uFillTx/>
-          <a:latin typeface="+mn-lt"/>
-          <a:ea typeface="+mn-ea"/>
-          <a:cs typeface="+mn-cs"/>
+          <a:latin typeface="Helvetica Light"/>
+          <a:ea typeface="Helvetica Light"/>
+          <a:cs typeface="Helvetica Light"/>
           <a:sym typeface="Helvetica Light"/>
         </a:defRPr>
       </a:lvl5pPr>
-      <a:lvl6pPr marL="0" marR="0" indent="1143000" algn="ctr" defTabSz="584200" rtl="0" latinLnBrk="0">
+      <a:lvl6pPr marL="0" marR="0" indent="0" algn="ctr" defTabSz="584200" rtl="0" latinLnBrk="0">
         <a:lnSpc>
           <a:spcPct val="100000"/>
         </a:lnSpc>
@@ -2346,13 +2337,13 @@
             <a:srgbClr val="000000"/>
           </a:solidFill>
           <a:uFillTx/>
-          <a:latin typeface="+mn-lt"/>
-          <a:ea typeface="+mn-ea"/>
-          <a:cs typeface="+mn-cs"/>
+          <a:latin typeface="Helvetica Light"/>
+          <a:ea typeface="Helvetica Light"/>
+          <a:cs typeface="Helvetica Light"/>
           <a:sym typeface="Helvetica Light"/>
         </a:defRPr>
       </a:lvl6pPr>
-      <a:lvl7pPr marL="0" marR="0" indent="1371600" algn="ctr" defTabSz="584200" rtl="0" latinLnBrk="0">
+      <a:lvl7pPr marL="0" marR="0" indent="0" algn="ctr" defTabSz="584200" rtl="0" latinLnBrk="0">
         <a:lnSpc>
           <a:spcPct val="100000"/>
         </a:lnSpc>
@@ -2375,13 +2366,13 @@
             <a:srgbClr val="000000"/>
           </a:solidFill>
           <a:uFillTx/>
-          <a:latin typeface="+mn-lt"/>
-          <a:ea typeface="+mn-ea"/>
-          <a:cs typeface="+mn-cs"/>
+          <a:latin typeface="Helvetica Light"/>
+          <a:ea typeface="Helvetica Light"/>
+          <a:cs typeface="Helvetica Light"/>
           <a:sym typeface="Helvetica Light"/>
         </a:defRPr>
       </a:lvl7pPr>
-      <a:lvl8pPr marL="0" marR="0" indent="1600200" algn="ctr" defTabSz="584200" rtl="0" latinLnBrk="0">
+      <a:lvl8pPr marL="0" marR="0" indent="0" algn="ctr" defTabSz="584200" rtl="0" latinLnBrk="0">
         <a:lnSpc>
           <a:spcPct val="100000"/>
         </a:lnSpc>
@@ -2404,13 +2395,13 @@
             <a:srgbClr val="000000"/>
           </a:solidFill>
           <a:uFillTx/>
-          <a:latin typeface="+mn-lt"/>
-          <a:ea typeface="+mn-ea"/>
-          <a:cs typeface="+mn-cs"/>
+          <a:latin typeface="Helvetica Light"/>
+          <a:ea typeface="Helvetica Light"/>
+          <a:cs typeface="Helvetica Light"/>
           <a:sym typeface="Helvetica Light"/>
         </a:defRPr>
       </a:lvl8pPr>
-      <a:lvl9pPr marL="0" marR="0" indent="1828800" algn="ctr" defTabSz="584200" rtl="0" latinLnBrk="0">
+      <a:lvl9pPr marL="0" marR="0" indent="0" algn="ctr" defTabSz="584200" rtl="0" latinLnBrk="0">
         <a:lnSpc>
           <a:spcPct val="100000"/>
         </a:lnSpc>
@@ -2433,9 +2424,9 @@
             <a:srgbClr val="000000"/>
           </a:solidFill>
           <a:uFillTx/>
-          <a:latin typeface="+mn-lt"/>
-          <a:ea typeface="+mn-ea"/>
-          <a:cs typeface="+mn-cs"/>
+          <a:latin typeface="Helvetica Light"/>
+          <a:ea typeface="Helvetica Light"/>
+          <a:cs typeface="Helvetica Light"/>
           <a:sym typeface="Helvetica Light"/>
         </a:defRPr>
       </a:lvl9pPr>
@@ -2464,9 +2455,9 @@
             <a:srgbClr val="000000"/>
           </a:solidFill>
           <a:uFillTx/>
-          <a:latin typeface="+mn-lt"/>
-          <a:ea typeface="+mn-ea"/>
-          <a:cs typeface="+mn-cs"/>
+          <a:latin typeface="Helvetica Light"/>
+          <a:ea typeface="Helvetica Light"/>
+          <a:cs typeface="Helvetica Light"/>
           <a:sym typeface="Helvetica Light"/>
         </a:defRPr>
       </a:lvl1pPr>
@@ -2493,9 +2484,9 @@
             <a:srgbClr val="000000"/>
           </a:solidFill>
           <a:uFillTx/>
-          <a:latin typeface="+mn-lt"/>
-          <a:ea typeface="+mn-ea"/>
-          <a:cs typeface="+mn-cs"/>
+          <a:latin typeface="Helvetica Light"/>
+          <a:ea typeface="Helvetica Light"/>
+          <a:cs typeface="Helvetica Light"/>
           <a:sym typeface="Helvetica Light"/>
         </a:defRPr>
       </a:lvl2pPr>
@@ -2522,9 +2513,9 @@
             <a:srgbClr val="000000"/>
           </a:solidFill>
           <a:uFillTx/>
-          <a:latin typeface="+mn-lt"/>
-          <a:ea typeface="+mn-ea"/>
-          <a:cs typeface="+mn-cs"/>
+          <a:latin typeface="Helvetica Light"/>
+          <a:ea typeface="Helvetica Light"/>
+          <a:cs typeface="Helvetica Light"/>
           <a:sym typeface="Helvetica Light"/>
         </a:defRPr>
       </a:lvl3pPr>
@@ -2551,9 +2542,9 @@
             <a:srgbClr val="000000"/>
           </a:solidFill>
           <a:uFillTx/>
-          <a:latin typeface="+mn-lt"/>
-          <a:ea typeface="+mn-ea"/>
-          <a:cs typeface="+mn-cs"/>
+          <a:latin typeface="Helvetica Light"/>
+          <a:ea typeface="Helvetica Light"/>
+          <a:cs typeface="Helvetica Light"/>
           <a:sym typeface="Helvetica Light"/>
         </a:defRPr>
       </a:lvl4pPr>
@@ -2580,9 +2571,9 @@
             <a:srgbClr val="000000"/>
           </a:solidFill>
           <a:uFillTx/>
-          <a:latin typeface="+mn-lt"/>
-          <a:ea typeface="+mn-ea"/>
-          <a:cs typeface="+mn-cs"/>
+          <a:latin typeface="Helvetica Light"/>
+          <a:ea typeface="Helvetica Light"/>
+          <a:cs typeface="Helvetica Light"/>
           <a:sym typeface="Helvetica Light"/>
         </a:defRPr>
       </a:lvl5pPr>
@@ -2609,9 +2600,9 @@
             <a:srgbClr val="000000"/>
           </a:solidFill>
           <a:uFillTx/>
-          <a:latin typeface="+mn-lt"/>
-          <a:ea typeface="+mn-ea"/>
-          <a:cs typeface="+mn-cs"/>
+          <a:latin typeface="Helvetica Light"/>
+          <a:ea typeface="Helvetica Light"/>
+          <a:cs typeface="Helvetica Light"/>
           <a:sym typeface="Helvetica Light"/>
         </a:defRPr>
       </a:lvl6pPr>
@@ -2638,9 +2629,9 @@
             <a:srgbClr val="000000"/>
           </a:solidFill>
           <a:uFillTx/>
-          <a:latin typeface="+mn-lt"/>
-          <a:ea typeface="+mn-ea"/>
-          <a:cs typeface="+mn-cs"/>
+          <a:latin typeface="Helvetica Light"/>
+          <a:ea typeface="Helvetica Light"/>
+          <a:cs typeface="Helvetica Light"/>
           <a:sym typeface="Helvetica Light"/>
         </a:defRPr>
       </a:lvl7pPr>
@@ -2667,9 +2658,9 @@
             <a:srgbClr val="000000"/>
           </a:solidFill>
           <a:uFillTx/>
-          <a:latin typeface="+mn-lt"/>
-          <a:ea typeface="+mn-ea"/>
-          <a:cs typeface="+mn-cs"/>
+          <a:latin typeface="Helvetica Light"/>
+          <a:ea typeface="Helvetica Light"/>
+          <a:cs typeface="Helvetica Light"/>
           <a:sym typeface="Helvetica Light"/>
         </a:defRPr>
       </a:lvl8pPr>
@@ -2696,9 +2687,9 @@
             <a:srgbClr val="000000"/>
           </a:solidFill>
           <a:uFillTx/>
-          <a:latin typeface="+mn-lt"/>
-          <a:ea typeface="+mn-ea"/>
-          <a:cs typeface="+mn-cs"/>
+          <a:latin typeface="Helvetica Light"/>
+          <a:ea typeface="Helvetica Light"/>
+          <a:cs typeface="Helvetica Light"/>
           <a:sym typeface="Helvetica Light"/>
         </a:defRPr>
       </a:lvl9pPr>
@@ -2733,7 +2724,7 @@
           <a:sym typeface="Helvetica Light"/>
         </a:defRPr>
       </a:lvl1pPr>
-      <a:lvl2pPr marL="0" marR="0" indent="228600" algn="ctr" defTabSz="584200" rtl="0" latinLnBrk="0">
+      <a:lvl2pPr marL="0" marR="0" indent="0" algn="ctr" defTabSz="584200" rtl="0" latinLnBrk="0">
         <a:lnSpc>
           <a:spcPct val="100000"/>
         </a:lnSpc>
@@ -2762,7 +2753,7 @@
           <a:sym typeface="Helvetica Light"/>
         </a:defRPr>
       </a:lvl2pPr>
-      <a:lvl3pPr marL="0" marR="0" indent="457200" algn="ctr" defTabSz="584200" rtl="0" latinLnBrk="0">
+      <a:lvl3pPr marL="0" marR="0" indent="0" algn="ctr" defTabSz="584200" rtl="0" latinLnBrk="0">
         <a:lnSpc>
           <a:spcPct val="100000"/>
         </a:lnSpc>
@@ -2791,7 +2782,7 @@
           <a:sym typeface="Helvetica Light"/>
         </a:defRPr>
       </a:lvl3pPr>
-      <a:lvl4pPr marL="0" marR="0" indent="685800" algn="ctr" defTabSz="584200" rtl="0" latinLnBrk="0">
+      <a:lvl4pPr marL="0" marR="0" indent="0" algn="ctr" defTabSz="584200" rtl="0" latinLnBrk="0">
         <a:lnSpc>
           <a:spcPct val="100000"/>
         </a:lnSpc>
@@ -2820,7 +2811,7 @@
           <a:sym typeface="Helvetica Light"/>
         </a:defRPr>
       </a:lvl4pPr>
-      <a:lvl5pPr marL="0" marR="0" indent="914400" algn="ctr" defTabSz="584200" rtl="0" latinLnBrk="0">
+      <a:lvl5pPr marL="0" marR="0" indent="0" algn="ctr" defTabSz="584200" rtl="0" latinLnBrk="0">
         <a:lnSpc>
           <a:spcPct val="100000"/>
         </a:lnSpc>
@@ -2849,7 +2840,7 @@
           <a:sym typeface="Helvetica Light"/>
         </a:defRPr>
       </a:lvl5pPr>
-      <a:lvl6pPr marL="0" marR="0" indent="1143000" algn="ctr" defTabSz="584200" rtl="0" latinLnBrk="0">
+      <a:lvl6pPr marL="0" marR="0" indent="0" algn="ctr" defTabSz="584200" rtl="0" latinLnBrk="0">
         <a:lnSpc>
           <a:spcPct val="100000"/>
         </a:lnSpc>
@@ -2878,7 +2869,7 @@
           <a:sym typeface="Helvetica Light"/>
         </a:defRPr>
       </a:lvl6pPr>
-      <a:lvl7pPr marL="0" marR="0" indent="1371600" algn="ctr" defTabSz="584200" rtl="0" latinLnBrk="0">
+      <a:lvl7pPr marL="0" marR="0" indent="0" algn="ctr" defTabSz="584200" rtl="0" latinLnBrk="0">
         <a:lnSpc>
           <a:spcPct val="100000"/>
         </a:lnSpc>
@@ -2907,7 +2898,7 @@
           <a:sym typeface="Helvetica Light"/>
         </a:defRPr>
       </a:lvl7pPr>
-      <a:lvl8pPr marL="0" marR="0" indent="1600200" algn="ctr" defTabSz="584200" rtl="0" latinLnBrk="0">
+      <a:lvl8pPr marL="0" marR="0" indent="0" algn="ctr" defTabSz="584200" rtl="0" latinLnBrk="0">
         <a:lnSpc>
           <a:spcPct val="100000"/>
         </a:lnSpc>
@@ -2936,7 +2927,7 @@
           <a:sym typeface="Helvetica Light"/>
         </a:defRPr>
       </a:lvl8pPr>
-      <a:lvl9pPr marL="0" marR="0" indent="1828800" algn="ctr" defTabSz="584200" rtl="0" latinLnBrk="0">
+      <a:lvl9pPr marL="0" marR="0" indent="0" algn="ctr" defTabSz="584200" rtl="0" latinLnBrk="0">
         <a:lnSpc>
           <a:spcPct val="100000"/>
         </a:lnSpc>
@@ -3116,7 +3107,7 @@
               <a:spcBef>
                 <a:spcPts val="3900"/>
               </a:spcBef>
-              <a:defRPr sz="3384"/>
+              <a:defRPr sz="3300"/>
             </a:pPr>
             <a:r>
               <a:t>Overall a register-based VM implementation is faster</a:t>
@@ -3127,7 +3118,7 @@
               <a:spcBef>
                 <a:spcPts val="3900"/>
               </a:spcBef>
-              <a:defRPr sz="3384"/>
+              <a:defRPr sz="3300"/>
             </a:pPr>
             <a:r>
               <a:t>Stack-based VM performs better in fetch time (less)</a:t>
@@ -3138,7 +3129,7 @@
               <a:spcBef>
                 <a:spcPts val="3900"/>
               </a:spcBef>
-              <a:defRPr sz="3384"/>
+              <a:defRPr sz="3300"/>
             </a:pPr>
             <a:r>
               <a:t>If you want to implement a high performance, compact DSL on limited hardware, go for a register-based VM!</a:t>
@@ -3149,7 +3140,7 @@
               <a:spcBef>
                 <a:spcPts val="3900"/>
               </a:spcBef>
-              <a:defRPr sz="3384"/>
+              <a:defRPr sz="3300"/>
             </a:pPr>
             <a:r>
               <a:t>If you favor simplicity (both in byte code and in code for VM) over performance and want to perform dense read/write to the VM’s memory space, implement a stack-based VM!</a:t>
@@ -3228,7 +3219,7 @@
               <a:spcBef>
                 <a:spcPts val="3600"/>
               </a:spcBef>
-              <a:defRPr sz="3096"/>
+              <a:defRPr sz="3000"/>
             </a:pPr>
             <a:r>
               <a:t>This PDF available at https://www.github.com/Conceptual-Inertia/presentations/plugtalk.pdf</a:t>
@@ -3239,13 +3230,21 @@
               <a:spcBef>
                 <a:spcPts val="3600"/>
               </a:spcBef>
-              <a:defRPr sz="3096"/>
+              <a:defRPr sz="3000"/>
             </a:pPr>
             <a:r>
               <a:t>Source code of Conceptum available at: </a:t>
             </a:r>
             <a:r>
               <a:rPr u="sng">
+                <a:solidFill>
+                  <a:srgbClr val="0000FF"/>
+                </a:solidFill>
+                <a:uFill>
+                  <a:solidFill>
+                    <a:srgbClr val="0000FF"/>
+                  </a:solidFill>
+                </a:uFill>
                 <a:hlinkClick r:id="rId2" invalidUrl="" action="" tgtFrame="" tooltip="" history="1" highlightClick="0" endSnd="0"/>
               </a:rPr>
               <a:t>https://www.github.com/Conceptual-Inertia/Conceptum</a:t>
@@ -3256,13 +3255,21 @@
               <a:spcBef>
                 <a:spcPts val="3600"/>
               </a:spcBef>
-              <a:defRPr sz="3096"/>
+              <a:defRPr sz="3000"/>
             </a:pPr>
             <a:r>
               <a:t>Source code of Inertia available at: </a:t>
             </a:r>
             <a:r>
               <a:rPr u="sng">
+                <a:solidFill>
+                  <a:srgbClr val="0000FF"/>
+                </a:solidFill>
+                <a:uFill>
+                  <a:solidFill>
+                    <a:srgbClr val="0000FF"/>
+                  </a:solidFill>
+                </a:uFill>
                 <a:hlinkClick r:id="rId3" invalidUrl="" action="" tgtFrame="" tooltip="" history="1" highlightClick="0" endSnd="0"/>
               </a:rPr>
               <a:t>https://www.github.com/Conceptual-Inertia/Inertia</a:t>
@@ -3273,13 +3280,21 @@
               <a:spcBef>
                 <a:spcPts val="3600"/>
               </a:spcBef>
-              <a:defRPr sz="3096"/>
+              <a:defRPr sz="3000"/>
             </a:pPr>
             <a:r>
               <a:t>The official paper available at: </a:t>
             </a:r>
             <a:r>
               <a:rPr u="sng">
+                <a:solidFill>
+                  <a:srgbClr val="0000FF"/>
+                </a:solidFill>
+                <a:uFill>
+                  <a:solidFill>
+                    <a:srgbClr val="0000FF"/>
+                  </a:solidFill>
+                </a:uFill>
                 <a:hlinkClick r:id="rId4" invalidUrl="" action="" tgtFrame="" tooltip="" history="1" highlightClick="0" endSnd="0"/>
               </a:rPr>
               <a:t>http://fat-sausage.derros.in/papers/vmplug.pdf</a:t>
@@ -3293,13 +3308,21 @@
               <a:spcBef>
                 <a:spcPts val="3600"/>
               </a:spcBef>
-              <a:defRPr sz="3096"/>
+              <a:defRPr sz="3000"/>
             </a:pPr>
             <a:r>
               <a:t>Questions? Critics? Suggestions? Email: </a:t>
             </a:r>
             <a:r>
               <a:rPr u="sng">
+                <a:solidFill>
+                  <a:srgbClr val="0000FF"/>
+                </a:solidFill>
+                <a:uFill>
+                  <a:solidFill>
+                    <a:srgbClr val="0000FF"/>
+                  </a:solidFill>
+                </a:uFill>
                 <a:hlinkClick r:id="rId5" invalidUrl="" action="" tgtFrame="" tooltip="" history="1" highlightClick="0" endSnd="0"/>
               </a:rPr>
               <a:t>frjalex@temple.edu</a:t>
@@ -3342,14 +3365,14 @@
         <p:grpSpPr>
           <a:xfrm>
             <a:off x="2364369" y="316537"/>
-            <a:ext cx="9044327" cy="9120526"/>
+            <a:ext cx="9044328" cy="9120528"/>
             <a:chOff x="0" y="0"/>
-            <a:chExt cx="9044325" cy="9120525"/>
+            <a:chExt cx="9044327" cy="9120527"/>
           </a:xfrm>
         </p:grpSpPr>
         <p:pic>
           <p:nvPicPr>
-            <p:cNvPr id="152" name="reisnersruleofconceptualinertia.png"/>
+            <p:cNvPr id="151" name="image4.png"/>
             <p:cNvPicPr>
               <a:picLocks noChangeAspect="1"/>
             </p:cNvPicPr>
@@ -3366,22 +3389,23 @@
           <p:spPr>
             <a:xfrm>
               <a:off x="127000" y="88900"/>
-              <a:ext cx="8790326" cy="8790326"/>
+              <a:ext cx="8790328" cy="8790328"/>
             </a:xfrm>
             <a:prstGeom prst="rect">
               <a:avLst/>
             </a:prstGeom>
-            <a:ln>
+            <a:ln w="12700" cap="flat">
               <a:noFill/>
+              <a:miter lim="400000"/>
             </a:ln>
             <a:effectLst/>
           </p:spPr>
         </p:pic>
         <p:pic>
           <p:nvPicPr>
-            <p:cNvPr id="151" name=""/>
+            <p:cNvPr id="152" name="image5.png"/>
             <p:cNvPicPr>
-              <a:picLocks noChangeAspect="0"/>
+              <a:picLocks noChangeAspect="1"/>
             </p:cNvPicPr>
             <p:nvPr/>
           </p:nvPicPr>
@@ -3396,11 +3420,15 @@
           <p:spPr>
             <a:xfrm>
               <a:off x="0" y="0"/>
-              <a:ext cx="9044326" cy="9120526"/>
+              <a:ext cx="9044328" cy="9120528"/>
             </a:xfrm>
             <a:prstGeom prst="rect">
               <a:avLst/>
             </a:prstGeom>
+            <a:ln w="12700" cap="flat">
+              <a:noFill/>
+              <a:miter lim="400000"/>
+            </a:ln>
             <a:effectLst/>
           </p:spPr>
         </p:pic>
@@ -3490,9 +3518,9 @@
             </a:r>
             <a:r>
               <a:rPr b="1">
-                <a:latin typeface="Helvetica"/>
-                <a:ea typeface="Helvetica"/>
-                <a:cs typeface="Helvetica"/>
+                <a:latin typeface="+mj-lt"/>
+                <a:ea typeface="+mj-ea"/>
+                <a:cs typeface="+mj-cs"/>
                 <a:sym typeface="Helvetica"/>
               </a:rPr>
               <a:t>WHY</a:t>
@@ -3580,7 +3608,7 @@
               <a:spcBef>
                 <a:spcPts val="3400"/>
               </a:spcBef>
-              <a:defRPr sz="2916"/>
+              <a:defRPr sz="2900"/>
             </a:pPr>
             <a:r>
               <a:t>Two MOST popular types of VM architectures today:</a:t>
@@ -3591,7 +3619,7 @@
               <a:spcBef>
                 <a:spcPts val="3400"/>
               </a:spcBef>
-              <a:defRPr sz="2916"/>
+              <a:defRPr sz="2900"/>
             </a:pPr>
             <a:r>
               <a:t>Stack-based architecture: CPython, JVM. Employs stacks to store data; implicit to specify memory address of storage in byte code</a:t>
@@ -3602,7 +3630,7 @@
               <a:spcBef>
                 <a:spcPts val="3400"/>
               </a:spcBef>
-              <a:defRPr sz="2916"/>
+              <a:defRPr sz="2900"/>
             </a:pPr>
             <a:r>
               <a:t>Register-based architecture: Lua, PHP*. Simulates a physical CPU (operates on registers; memory address needs to be explicitly specified)</a:t>
@@ -3613,18 +3641,18 @@
               <a:spcBef>
                 <a:spcPts val="3400"/>
               </a:spcBef>
-              <a:defRPr sz="2916"/>
+              <a:defRPr sz="2900"/>
             </a:pPr>
             <a:r>
               <a:t>Other architectures exist, e.g. Hybrid, Accumulator (not extremely popular)</a:t>
             </a:r>
           </a:p>
           <a:p>
-            <a:pPr marL="360045" indent="-360045" defTabSz="473201">
+            <a:pPr marL="360044" indent="-360044" defTabSz="473201">
               <a:spcBef>
                 <a:spcPts val="3400"/>
               </a:spcBef>
-              <a:defRPr sz="2268"/>
+              <a:defRPr sz="2200"/>
             </a:pPr>
             <a:r>
               <a:t>*: Another controversial topic</a:t>
@@ -3668,8 +3696,8 @@
         </p:nvSpPr>
         <p:spPr>
           <a:xfrm>
-            <a:off x="952499" y="3364963"/>
-            <a:ext cx="11099801" cy="2159001"/>
+            <a:off x="952498" y="3364962"/>
+            <a:ext cx="11099803" cy="2159002"/>
           </a:xfrm>
           <a:prstGeom prst="rect">
             <a:avLst/>
@@ -3680,16 +3708,16 @@
           <a:lstStyle/>
           <a:p>
             <a:pPr defTabSz="490727">
-              <a:defRPr sz="6719"/>
+              <a:defRPr sz="6700"/>
             </a:pPr>
             <a:r>
               <a:t>Stack-based and register-based VM, </a:t>
             </a:r>
             <a:r>
               <a:rPr b="1">
-                <a:latin typeface="Helvetica"/>
-                <a:ea typeface="Helvetica"/>
-                <a:cs typeface="Helvetica"/>
+                <a:latin typeface="+mj-lt"/>
+                <a:ea typeface="+mj-ea"/>
+                <a:cs typeface="+mj-cs"/>
                 <a:sym typeface="Helvetica"/>
               </a:rPr>
               <a:t>which is faster?</a:t>
@@ -3764,95 +3792,110 @@
           <a:bodyPr/>
           <a:lstStyle/>
           <a:p>
-            <a:pPr marL="342264" indent="-342264" defTabSz="449833">
+            <a:pPr marL="342263" indent="-342263" defTabSz="449833">
               <a:spcBef>
                 <a:spcPts val="3200"/>
               </a:spcBef>
-              <a:defRPr sz="2772"/>
+              <a:defRPr sz="2700"/>
             </a:pPr>
             <a:r>
               <a:t>1: What approach to take?</a:t>
             </a:r>
           </a:p>
           <a:p>
-            <a:pPr marL="342264" indent="-342264" defTabSz="449833">
+            <a:pPr marL="342263" indent="-342263" defTabSz="449833">
               <a:spcBef>
                 <a:spcPts val="3200"/>
               </a:spcBef>
-              <a:defRPr sz="2772"/>
+              <a:defRPr sz="2700"/>
             </a:pPr>
             <a:r>
               <a:t>2: Measuring performance</a:t>
             </a:r>
           </a:p>
           <a:p>
-            <a:pPr lvl="1" marL="684529" indent="-342264" defTabSz="449833">
+            <a:pPr lvl="1" marL="684529" indent="-342263" defTabSz="449833">
               <a:spcBef>
                 <a:spcPts val="3200"/>
               </a:spcBef>
-              <a:defRPr sz="2772"/>
+              <a:defRPr sz="2700"/>
             </a:pPr>
             <a:r>
               <a:t>The less time it takes, the faster!</a:t>
             </a:r>
           </a:p>
           <a:p>
-            <a:pPr lvl="1" marL="684529" indent="-342264" defTabSz="449833">
+            <a:pPr lvl="1" marL="684529" indent="-342263" defTabSz="449833">
               <a:spcBef>
                 <a:spcPts val="3200"/>
               </a:spcBef>
-              <a:defRPr sz="2772"/>
+              <a:defRPr b="1" sz="2700">
+                <a:latin typeface="+mj-lt"/>
+                <a:ea typeface="+mj-ea"/>
+                <a:cs typeface="+mj-cs"/>
+                <a:sym typeface="Helvetica"/>
+              </a:defRPr>
             </a:pPr>
             <a:r>
-              <a:rPr b="1">
-                <a:latin typeface="Helvetica"/>
-                <a:ea typeface="Helvetica"/>
-                <a:cs typeface="Helvetica"/>
-                <a:sym typeface="Helvetica"/>
+              <a:t>dispatch time</a:t>
+            </a:r>
+            <a:r>
+              <a:rPr b="0">
+                <a:latin typeface="Helvetica Light"/>
+                <a:ea typeface="Helvetica Light"/>
+                <a:cs typeface="Helvetica Light"/>
+                <a:sym typeface="Helvetica Light"/>
               </a:rPr>
-              <a:t>dispatch time</a:t>
-            </a:r>
-            <a:r>
               <a:t> = the time spent matching a byte code instructor with a particular operation function on VM (we use only switch dispatch); </a:t>
             </a:r>
           </a:p>
           <a:p>
-            <a:pPr lvl="1" marL="684529" indent="-342264" defTabSz="449833">
+            <a:pPr lvl="1" marL="684529" indent="-342263" defTabSz="449833">
               <a:spcBef>
                 <a:spcPts val="3200"/>
               </a:spcBef>
-              <a:defRPr sz="2772"/>
+              <a:defRPr b="1" sz="2700">
+                <a:latin typeface="+mj-lt"/>
+                <a:ea typeface="+mj-ea"/>
+                <a:cs typeface="+mj-cs"/>
+                <a:sym typeface="Helvetica"/>
+              </a:defRPr>
             </a:pPr>
             <a:r>
-              <a:rPr b="1">
-                <a:latin typeface="Helvetica"/>
-                <a:ea typeface="Helvetica"/>
-                <a:cs typeface="Helvetica"/>
-                <a:sym typeface="Helvetica"/>
+              <a:t>fetch time</a:t>
+            </a:r>
+            <a:r>
+              <a:rPr b="0">
+                <a:latin typeface="Helvetica Light"/>
+                <a:ea typeface="Helvetica Light"/>
+                <a:cs typeface="Helvetica Light"/>
+                <a:sym typeface="Helvetica Light"/>
               </a:rPr>
-              <a:t>fetch time</a:t>
-            </a:r>
-            <a:r>
               <a:t> = the time spent to fetch ONE instruction from a sequence of processed inputs</a:t>
             </a:r>
           </a:p>
           <a:p>
-            <a:pPr lvl="1" marL="684529" indent="-342264" defTabSz="449833">
+            <a:pPr lvl="1" marL="684529" indent="-342263" defTabSz="449833">
               <a:spcBef>
                 <a:spcPts val="3200"/>
               </a:spcBef>
-              <a:defRPr sz="2772"/>
+              <a:defRPr b="1" sz="2700">
+                <a:latin typeface="+mj-lt"/>
+                <a:ea typeface="+mj-ea"/>
+                <a:cs typeface="+mj-cs"/>
+                <a:sym typeface="Helvetica"/>
+              </a:defRPr>
             </a:pPr>
             <a:r>
-              <a:rPr b="1">
-                <a:latin typeface="Helvetica"/>
-                <a:ea typeface="Helvetica"/>
-                <a:cs typeface="Helvetica"/>
-                <a:sym typeface="Helvetica"/>
+              <a:t>execution time</a:t>
+            </a:r>
+            <a:r>
+              <a:rPr b="0">
+                <a:latin typeface="Helvetica Light"/>
+                <a:ea typeface="Helvetica Light"/>
+                <a:cs typeface="Helvetica Light"/>
+                <a:sym typeface="Helvetica Light"/>
               </a:rPr>
-              <a:t>execution time</a:t>
-            </a:r>
-            <a:r>
               <a:t> = total time spent executing byte code instructions</a:t>
             </a:r>
           </a:p>
@@ -3918,8 +3961,8 @@
         </p:nvSpPr>
         <p:spPr>
           <a:xfrm>
-            <a:off x="846049" y="2502192"/>
-            <a:ext cx="11312703" cy="6724785"/>
+            <a:off x="846048" y="2502192"/>
+            <a:ext cx="11312705" cy="6724785"/>
           </a:xfrm>
           <a:prstGeom prst="rect">
             <a:avLst/>
@@ -3929,99 +3972,99 @@
           <a:bodyPr/>
           <a:lstStyle/>
           <a:p>
-            <a:pPr marL="280034" indent="-280034" defTabSz="368045">
+            <a:pPr marL="280033" indent="-280033" defTabSz="368045">
               <a:spcBef>
                 <a:spcPts val="2600"/>
               </a:spcBef>
-              <a:defRPr sz="2268"/>
+              <a:defRPr sz="2200"/>
             </a:pPr>
             <a:r>
               <a:t>In an interpreted language: runtime performance</a:t>
             </a:r>
           </a:p>
           <a:p>
-            <a:pPr marL="280034" indent="-280034" defTabSz="368045">
+            <a:pPr marL="280033" indent="-280033" defTabSz="368045">
               <a:spcBef>
                 <a:spcPts val="2600"/>
               </a:spcBef>
-              <a:defRPr sz="2268"/>
+              <a:defRPr sz="2200"/>
             </a:pPr>
             <a:r>
               <a:t>Directly, the less time the better</a:t>
             </a:r>
           </a:p>
           <a:p>
-            <a:pPr marL="280034" indent="-280034" defTabSz="368045">
+            <a:pPr marL="280033" indent="-280033" defTabSz="368045">
               <a:spcBef>
                 <a:spcPts val="2600"/>
               </a:spcBef>
-              <a:defRPr sz="2268"/>
+              <a:defRPr sz="2200"/>
             </a:pPr>
             <a:r>
               <a:t>Since register byte code contains 3 operands and stack contains only one, stack can be faster on overall fetch time</a:t>
             </a:r>
           </a:p>
           <a:p>
-            <a:pPr marL="280034" indent="-280034" defTabSz="368045">
+            <a:pPr marL="280033" indent="-280033" defTabSz="368045">
               <a:spcBef>
                 <a:spcPts val="2600"/>
               </a:spcBef>
-              <a:defRPr sz="2268"/>
+              <a:defRPr sz="2200"/>
             </a:pPr>
             <a:r>
               <a:t>Since register byte code contains memory addresses (and stack doesn’t) registers can be faster on dispatch time, having less amount of dispatches</a:t>
             </a:r>
           </a:p>
           <a:p>
-            <a:pPr marL="280034" indent="-280034" defTabSz="368045">
+            <a:pPr marL="280033" indent="-280033" defTabSz="368045">
               <a:spcBef>
                 <a:spcPts val="2600"/>
               </a:spcBef>
-              <a:defRPr sz="2268"/>
+              <a:defRPr sz="2200"/>
             </a:pPr>
             <a:r>
               <a:t>Factors of performance:</a:t>
             </a:r>
           </a:p>
           <a:p>
-            <a:pPr lvl="1" marL="560069" indent="-280034" defTabSz="368045">
+            <a:pPr lvl="1" marL="560069" indent="-280033" defTabSz="368045">
               <a:spcBef>
                 <a:spcPts val="2600"/>
               </a:spcBef>
-              <a:defRPr sz="2268"/>
+              <a:defRPr sz="2200"/>
             </a:pPr>
             <a:r>
               <a:t>Amount of dispatches</a:t>
             </a:r>
           </a:p>
           <a:p>
-            <a:pPr lvl="1" marL="560069" indent="-280034" defTabSz="368045">
+            <a:pPr lvl="1" marL="560069" indent="-280033" defTabSz="368045">
               <a:spcBef>
                 <a:spcPts val="2600"/>
               </a:spcBef>
-              <a:defRPr sz="2268"/>
+              <a:defRPr sz="2200"/>
             </a:pPr>
             <a:r>
               <a:t>Total time spent in dispatch</a:t>
             </a:r>
           </a:p>
           <a:p>
-            <a:pPr lvl="1" marL="560069" indent="-280034" defTabSz="368045">
+            <a:pPr lvl="1" marL="560069" indent="-280033" defTabSz="368045">
               <a:spcBef>
                 <a:spcPts val="2600"/>
               </a:spcBef>
-              <a:defRPr sz="2268"/>
+              <a:defRPr sz="2200"/>
             </a:pPr>
             <a:r>
               <a:t>Total time spent in fetch</a:t>
             </a:r>
           </a:p>
           <a:p>
-            <a:pPr lvl="1" marL="560069" indent="-280034" defTabSz="368045">
+            <a:pPr lvl="1" marL="560069" indent="-280033" defTabSz="368045">
               <a:spcBef>
                 <a:spcPts val="2600"/>
               </a:spcBef>
-              <a:defRPr sz="2268"/>
+              <a:defRPr sz="2200"/>
             </a:pPr>
             <a:r>
               <a:t>Execution time (not including the part parsing byte code)</a:t>
@@ -4089,8 +4132,8 @@
         </p:nvSpPr>
         <p:spPr>
           <a:xfrm>
-            <a:off x="952500" y="2609849"/>
-            <a:ext cx="11099800" cy="6286501"/>
+            <a:off x="952500" y="2609848"/>
+            <a:ext cx="11099800" cy="6286503"/>
           </a:xfrm>
           <a:prstGeom prst="rect">
             <a:avLst/>
@@ -4104,7 +4147,7 @@
               <a:spcBef>
                 <a:spcPts val="2900"/>
               </a:spcBef>
-              <a:defRPr sz="2520"/>
+              <a:defRPr sz="2500"/>
             </a:pPr>
             <a:r>
               <a:t>Writing two new VMs with timing mechanisms built-in and with structural similarities in mind - and measure the runtime performance - “Conceptum”, the stack-based VM, and “Inertia”, the register-based VM, written entirely in ANSI C11</a:t>
@@ -4115,7 +4158,7 @@
               <a:spcBef>
                 <a:spcPts val="2900"/>
               </a:spcBef>
-              <a:defRPr sz="2520"/>
+              <a:defRPr sz="2500"/>
             </a:pPr>
             <a:r>
               <a:t>Timing: the less the faster</a:t>
@@ -4126,7 +4169,7 @@
               <a:spcBef>
                 <a:spcPts val="2900"/>
               </a:spcBef>
-              <a:defRPr sz="2520"/>
+              <a:defRPr sz="2500"/>
             </a:pPr>
             <a:r>
               <a:t>A few vocab: </a:t>
@@ -4137,7 +4180,7 @@
               <a:spcBef>
                 <a:spcPts val="2900"/>
               </a:spcBef>
-              <a:defRPr sz="2520"/>
+              <a:defRPr sz="2500"/>
             </a:pPr>
             <a:r>
               <a:t>dispatch time = the time spent matching a byte code instructor with a particular operation function on VM (we use only switch dispatch); </a:t>
@@ -4148,7 +4191,7 @@
               <a:spcBef>
                 <a:spcPts val="2900"/>
               </a:spcBef>
-              <a:defRPr sz="2520"/>
+              <a:defRPr sz="2500"/>
             </a:pPr>
             <a:r>
               <a:t>fetch time = the time spent to fetch ONE instruction from a sequence of processed inputs</a:t>
@@ -4159,7 +4202,7 @@
               <a:spcBef>
                 <a:spcPts val="2900"/>
               </a:spcBef>
-              <a:defRPr sz="2520"/>
+              <a:defRPr sz="2500"/>
             </a:pPr>
             <a:r>
               <a:t>execution time = total time spent executing byte code instructions</a:t>
@@ -4210,7 +4253,7 @@
           <a:bodyPr/>
           <a:lstStyle>
             <a:lvl1pPr defTabSz="572516">
-              <a:defRPr sz="7840"/>
+              <a:defRPr sz="7800"/>
             </a:lvl1pPr>
           </a:lstStyle>
           <a:p>
@@ -4223,7 +4266,7 @@
       </p:sp>
       <p:pic>
         <p:nvPicPr>
-          <p:cNvPr id="140" name="Screen Shot 2016-11-02 at 2.18.17 PM.png"/>
+          <p:cNvPr id="140" name="image2.png"/>
           <p:cNvPicPr>
             <a:picLocks noChangeAspect="1"/>
           </p:cNvPicPr>
@@ -4240,7 +4283,7 @@
         <p:spPr>
           <a:xfrm>
             <a:off x="1463163" y="2185497"/>
-            <a:ext cx="9629638" cy="7459702"/>
+            <a:ext cx="9629638" cy="7459703"/>
           </a:xfrm>
           <a:prstGeom prst="rect">
             <a:avLst/>
@@ -4302,7 +4345,7 @@
       </p:sp>
       <p:pic>
         <p:nvPicPr>
-          <p:cNvPr id="143" name="Screen Shot 2016-11-02 at 2.18.41 PM.png"/>
+          <p:cNvPr id="143" name="image3.png"/>
           <p:cNvPicPr>
             <a:picLocks noChangeAspect="1"/>
           </p:cNvPicPr>
@@ -4319,7 +4362,7 @@
         <p:spPr>
           <a:xfrm>
             <a:off x="1832004" y="2039372"/>
-            <a:ext cx="9340792" cy="7748123"/>
+            <a:ext cx="9340792" cy="7748124"/>
           </a:xfrm>
           <a:prstGeom prst="rect">
             <a:avLst/>
@@ -4349,10 +4392,10 @@
         <a:srgbClr val="FFFFFF"/>
       </a:lt1>
       <a:dk2>
-        <a:srgbClr val="53585F"/>
+        <a:srgbClr val="A7A7A7"/>
       </a:dk2>
       <a:lt2>
-        <a:srgbClr val="DCDEE0"/>
+        <a:srgbClr val="535353"/>
       </a:lt2>
       <a:accent1>
         <a:srgbClr val="0365C0"/>
@@ -4381,14 +4424,14 @@
     </a:clrScheme>
     <a:fontScheme name="White">
       <a:majorFont>
-        <a:latin typeface="Helvetica Light"/>
-        <a:ea typeface="Helvetica Light"/>
-        <a:cs typeface="Helvetica Light"/>
+        <a:latin typeface="Helvetica"/>
+        <a:ea typeface="Helvetica"/>
+        <a:cs typeface="Helvetica"/>
       </a:majorFont>
       <a:minorFont>
-        <a:latin typeface="Helvetica Light"/>
-        <a:ea typeface="Helvetica Light"/>
-        <a:cs typeface="Helvetica Light"/>
+        <a:latin typeface="Helvetica Neue"/>
+        <a:ea typeface="Helvetica Neue"/>
+        <a:cs typeface="Helvetica Neue"/>
       </a:minorFont>
     </a:fontScheme>
     <a:fmtScheme name="White">
@@ -4474,7 +4517,7 @@
         </a:effectStyle>
         <a:effectStyle>
           <a:effectLst>
-            <a:outerShdw sx="100000" sy="100000" kx="0" ky="0" algn="b" rotWithShape="0" blurRad="50800" dist="12700" dir="0">
+            <a:outerShdw sx="100000" sy="100000" kx="0" ky="0" algn="b" rotWithShape="0" blurRad="38100" dist="25400" dir="5400000">
               <a:srgbClr val="000000">
                 <a:alpha val="50000"/>
               </a:srgbClr>
@@ -4546,14 +4589,15 @@
   <a:objectDefaults>
     <a:spDef>
       <a:spPr>
-        <a:blipFill rotWithShape="1">
-          <a:blip r:embed="rId1"/>
-          <a:srcRect l="0" t="0" r="0" b="0"/>
-          <a:tile tx="0" ty="0" sx="100000" sy="100000" flip="none" algn="tl"/>
-        </a:blipFill>
-        <a:ln w="12700" cap="flat">
-          <a:noFill/>
-          <a:miter lim="400000"/>
+        <a:solidFill>
+          <a:srgbClr val="FFFFFF"/>
+        </a:solidFill>
+        <a:ln w="25400" cap="flat">
+          <a:solidFill>
+            <a:schemeClr val="accent1"/>
+          </a:solidFill>
+          <a:prstDash val="solid"/>
+          <a:round/>
         </a:ln>
         <a:effectLst>
           <a:outerShdw sx="100000" sy="100000" kx="0" ky="0" algn="b" rotWithShape="0" blurRad="38100" dist="25400" dir="5400000">
@@ -4583,18 +4627,18 @@
           <a:buFontTx/>
           <a:buNone/>
           <a:tabLst/>
-          <a:defRPr b="0" baseline="0" cap="none" i="0" spc="0" strike="noStrike" sz="2400" u="none" kumimoji="0" normalizeH="0">
+          <a:defRPr b="0" baseline="0" cap="none" i="0" spc="0" strike="noStrike" sz="3600" u="none" kumimoji="0" normalizeH="0">
             <a:ln>
               <a:noFill/>
             </a:ln>
             <a:solidFill>
-              <a:srgbClr val="FFFFFF"/>
+              <a:srgbClr val="000000"/>
             </a:solidFill>
             <a:effectLst/>
             <a:uFillTx/>
-            <a:latin typeface="+mn-lt"/>
-            <a:ea typeface="+mn-ea"/>
-            <a:cs typeface="+mn-cs"/>
+            <a:latin typeface="Helvetica Light"/>
+            <a:ea typeface="Helvetica Light"/>
+            <a:cs typeface="Helvetica Light"/>
             <a:sym typeface="Helvetica Light"/>
           </a:defRPr>
         </a:defPPr>
@@ -4845,12 +4889,18 @@
         <a:noFill/>
         <a:ln w="25400" cap="flat">
           <a:solidFill>
-            <a:srgbClr val="000000"/>
+            <a:schemeClr val="accent1"/>
           </a:solidFill>
           <a:prstDash val="solid"/>
-          <a:miter lim="400000"/>
+          <a:round/>
         </a:ln>
-        <a:effectLst/>
+        <a:effectLst>
+          <a:outerShdw sx="100000" sy="100000" kx="0" ky="0" algn="b" rotWithShape="0" blurRad="38100" dist="25400" dir="5400000">
+            <a:srgbClr val="000000">
+              <a:alpha val="50000"/>
+            </a:srgbClr>
+          </a:outerShdw>
+        </a:effectLst>
         <a:sp3d/>
       </a:spPr>
       <a:bodyPr rot="0" spcFirstLastPara="1" vertOverflow="overflow" horzOverflow="overflow" vert="horz" wrap="square" lIns="91439" tIns="45719" rIns="91439" bIns="45719" numCol="1" spcCol="38100" rtlCol="0" anchor="t" upright="0">
@@ -5163,9 +5213,9 @@
             </a:solidFill>
             <a:effectLst/>
             <a:uFillTx/>
-            <a:latin typeface="+mn-lt"/>
-            <a:ea typeface="+mn-ea"/>
-            <a:cs typeface="+mn-cs"/>
+            <a:latin typeface="Helvetica Light"/>
+            <a:ea typeface="Helvetica Light"/>
+            <a:cs typeface="Helvetica Light"/>
             <a:sym typeface="Helvetica Light"/>
           </a:defRPr>
         </a:defPPr>
@@ -5426,10 +5476,10 @@
         <a:srgbClr val="FFFFFF"/>
       </a:lt1>
       <a:dk2>
-        <a:srgbClr val="53585F"/>
+        <a:srgbClr val="A7A7A7"/>
       </a:dk2>
       <a:lt2>
-        <a:srgbClr val="DCDEE0"/>
+        <a:srgbClr val="535353"/>
       </a:lt2>
       <a:accent1>
         <a:srgbClr val="0365C0"/>
@@ -5458,14 +5508,14 @@
     </a:clrScheme>
     <a:fontScheme name="White">
       <a:majorFont>
-        <a:latin typeface="Helvetica Light"/>
-        <a:ea typeface="Helvetica Light"/>
-        <a:cs typeface="Helvetica Light"/>
+        <a:latin typeface="Helvetica"/>
+        <a:ea typeface="Helvetica"/>
+        <a:cs typeface="Helvetica"/>
       </a:majorFont>
       <a:minorFont>
-        <a:latin typeface="Helvetica Light"/>
-        <a:ea typeface="Helvetica Light"/>
-        <a:cs typeface="Helvetica Light"/>
+        <a:latin typeface="Helvetica Neue"/>
+        <a:ea typeface="Helvetica Neue"/>
+        <a:cs typeface="Helvetica Neue"/>
       </a:minorFont>
     </a:fontScheme>
     <a:fmtScheme name="White">
@@ -5551,7 +5601,7 @@
         </a:effectStyle>
         <a:effectStyle>
           <a:effectLst>
-            <a:outerShdw sx="100000" sy="100000" kx="0" ky="0" algn="b" rotWithShape="0" blurRad="50800" dist="12700" dir="0">
+            <a:outerShdw sx="100000" sy="100000" kx="0" ky="0" algn="b" rotWithShape="0" blurRad="38100" dist="25400" dir="5400000">
               <a:srgbClr val="000000">
                 <a:alpha val="50000"/>
               </a:srgbClr>
@@ -5623,14 +5673,15 @@
   <a:objectDefaults>
     <a:spDef>
       <a:spPr>
-        <a:blipFill rotWithShape="1">
-          <a:blip r:embed="rId1"/>
-          <a:srcRect l="0" t="0" r="0" b="0"/>
-          <a:tile tx="0" ty="0" sx="100000" sy="100000" flip="none" algn="tl"/>
-        </a:blipFill>
-        <a:ln w="12700" cap="flat">
-          <a:noFill/>
-          <a:miter lim="400000"/>
+        <a:solidFill>
+          <a:srgbClr val="FFFFFF"/>
+        </a:solidFill>
+        <a:ln w="25400" cap="flat">
+          <a:solidFill>
+            <a:schemeClr val="accent1"/>
+          </a:solidFill>
+          <a:prstDash val="solid"/>
+          <a:round/>
         </a:ln>
         <a:effectLst>
           <a:outerShdw sx="100000" sy="100000" kx="0" ky="0" algn="b" rotWithShape="0" blurRad="38100" dist="25400" dir="5400000">
@@ -5660,18 +5711,18 @@
           <a:buFontTx/>
           <a:buNone/>
           <a:tabLst/>
-          <a:defRPr b="0" baseline="0" cap="none" i="0" spc="0" strike="noStrike" sz="2400" u="none" kumimoji="0" normalizeH="0">
+          <a:defRPr b="0" baseline="0" cap="none" i="0" spc="0" strike="noStrike" sz="3600" u="none" kumimoji="0" normalizeH="0">
             <a:ln>
               <a:noFill/>
             </a:ln>
             <a:solidFill>
-              <a:srgbClr val="FFFFFF"/>
+              <a:srgbClr val="000000"/>
             </a:solidFill>
             <a:effectLst/>
             <a:uFillTx/>
-            <a:latin typeface="+mn-lt"/>
-            <a:ea typeface="+mn-ea"/>
-            <a:cs typeface="+mn-cs"/>
+            <a:latin typeface="Helvetica Light"/>
+            <a:ea typeface="Helvetica Light"/>
+            <a:cs typeface="Helvetica Light"/>
             <a:sym typeface="Helvetica Light"/>
           </a:defRPr>
         </a:defPPr>
@@ -5922,12 +5973,18 @@
         <a:noFill/>
         <a:ln w="25400" cap="flat">
           <a:solidFill>
-            <a:srgbClr val="000000"/>
+            <a:schemeClr val="accent1"/>
           </a:solidFill>
           <a:prstDash val="solid"/>
-          <a:miter lim="400000"/>
+          <a:round/>
         </a:ln>
-        <a:effectLst/>
+        <a:effectLst>
+          <a:outerShdw sx="100000" sy="100000" kx="0" ky="0" algn="b" rotWithShape="0" blurRad="38100" dist="25400" dir="5400000">
+            <a:srgbClr val="000000">
+              <a:alpha val="50000"/>
+            </a:srgbClr>
+          </a:outerShdw>
+        </a:effectLst>
         <a:sp3d/>
       </a:spPr>
       <a:bodyPr rot="0" spcFirstLastPara="1" vertOverflow="overflow" horzOverflow="overflow" vert="horz" wrap="square" lIns="91439" tIns="45719" rIns="91439" bIns="45719" numCol="1" spcCol="38100" rtlCol="0" anchor="t" upright="0">
@@ -6240,9 +6297,9 @@
             </a:solidFill>
             <a:effectLst/>
             <a:uFillTx/>
-            <a:latin typeface="+mn-lt"/>
-            <a:ea typeface="+mn-ea"/>
-            <a:cs typeface="+mn-cs"/>
+            <a:latin typeface="Helvetica Light"/>
+            <a:ea typeface="Helvetica Light"/>
+            <a:cs typeface="Helvetica Light"/>
             <a:sym typeface="Helvetica Light"/>
           </a:defRPr>
         </a:defPPr>

</xml_diff>